<commit_message>
20220509 Docs : 첫 번째 ppt 업데이트
</commit_message>
<xml_diff>
--- a/docs/nlp_IRun_01.pptx
+++ b/docs/nlp_IRun_01.pptx
@@ -272,7 +272,7 @@
           <a:p>
             <a:fld id="{0DE30E30-8A3F-4C87-9FDC-8C9A3551B329}" type="datetimeFigureOut">
               <a:rPr lang="ko-KR" altLang="en-US" smtClean="0"/>
-              <a:t>2022-05-08</a:t>
+              <a:t>2022-05-09</a:t>
             </a:fld>
             <a:endParaRPr lang="ko-KR" altLang="en-US"/>
           </a:p>
@@ -470,7 +470,7 @@
           <a:p>
             <a:fld id="{0DE30E30-8A3F-4C87-9FDC-8C9A3551B329}" type="datetimeFigureOut">
               <a:rPr lang="ko-KR" altLang="en-US" smtClean="0"/>
-              <a:t>2022-05-08</a:t>
+              <a:t>2022-05-09</a:t>
             </a:fld>
             <a:endParaRPr lang="ko-KR" altLang="en-US"/>
           </a:p>
@@ -678,7 +678,7 @@
           <a:p>
             <a:fld id="{0DE30E30-8A3F-4C87-9FDC-8C9A3551B329}" type="datetimeFigureOut">
               <a:rPr lang="ko-KR" altLang="en-US" smtClean="0"/>
-              <a:t>2022-05-08</a:t>
+              <a:t>2022-05-09</a:t>
             </a:fld>
             <a:endParaRPr lang="ko-KR" altLang="en-US"/>
           </a:p>
@@ -876,7 +876,7 @@
           <a:p>
             <a:fld id="{0DE30E30-8A3F-4C87-9FDC-8C9A3551B329}" type="datetimeFigureOut">
               <a:rPr lang="ko-KR" altLang="en-US" smtClean="0"/>
-              <a:t>2022-05-08</a:t>
+              <a:t>2022-05-09</a:t>
             </a:fld>
             <a:endParaRPr lang="ko-KR" altLang="en-US"/>
           </a:p>
@@ -1151,7 +1151,7 @@
           <a:p>
             <a:fld id="{0DE30E30-8A3F-4C87-9FDC-8C9A3551B329}" type="datetimeFigureOut">
               <a:rPr lang="ko-KR" altLang="en-US" smtClean="0"/>
-              <a:t>2022-05-08</a:t>
+              <a:t>2022-05-09</a:t>
             </a:fld>
             <a:endParaRPr lang="ko-KR" altLang="en-US"/>
           </a:p>
@@ -1416,7 +1416,7 @@
           <a:p>
             <a:fld id="{0DE30E30-8A3F-4C87-9FDC-8C9A3551B329}" type="datetimeFigureOut">
               <a:rPr lang="ko-KR" altLang="en-US" smtClean="0"/>
-              <a:t>2022-05-08</a:t>
+              <a:t>2022-05-09</a:t>
             </a:fld>
             <a:endParaRPr lang="ko-KR" altLang="en-US"/>
           </a:p>
@@ -1828,7 +1828,7 @@
           <a:p>
             <a:fld id="{0DE30E30-8A3F-4C87-9FDC-8C9A3551B329}" type="datetimeFigureOut">
               <a:rPr lang="ko-KR" altLang="en-US" smtClean="0"/>
-              <a:t>2022-05-08</a:t>
+              <a:t>2022-05-09</a:t>
             </a:fld>
             <a:endParaRPr lang="ko-KR" altLang="en-US"/>
           </a:p>
@@ -1969,7 +1969,7 @@
           <a:p>
             <a:fld id="{0DE30E30-8A3F-4C87-9FDC-8C9A3551B329}" type="datetimeFigureOut">
               <a:rPr lang="ko-KR" altLang="en-US" smtClean="0"/>
-              <a:t>2022-05-08</a:t>
+              <a:t>2022-05-09</a:t>
             </a:fld>
             <a:endParaRPr lang="ko-KR" altLang="en-US"/>
           </a:p>
@@ -2082,7 +2082,7 @@
           <a:p>
             <a:fld id="{0DE30E30-8A3F-4C87-9FDC-8C9A3551B329}" type="datetimeFigureOut">
               <a:rPr lang="ko-KR" altLang="en-US" smtClean="0"/>
-              <a:t>2022-05-08</a:t>
+              <a:t>2022-05-09</a:t>
             </a:fld>
             <a:endParaRPr lang="ko-KR" altLang="en-US"/>
           </a:p>
@@ -2393,7 +2393,7 @@
           <a:p>
             <a:fld id="{0DE30E30-8A3F-4C87-9FDC-8C9A3551B329}" type="datetimeFigureOut">
               <a:rPr lang="ko-KR" altLang="en-US" smtClean="0"/>
-              <a:t>2022-05-08</a:t>
+              <a:t>2022-05-09</a:t>
             </a:fld>
             <a:endParaRPr lang="ko-KR" altLang="en-US"/>
           </a:p>
@@ -2681,7 +2681,7 @@
           <a:p>
             <a:fld id="{0DE30E30-8A3F-4C87-9FDC-8C9A3551B329}" type="datetimeFigureOut">
               <a:rPr lang="ko-KR" altLang="en-US" smtClean="0"/>
-              <a:t>2022-05-08</a:t>
+              <a:t>2022-05-09</a:t>
             </a:fld>
             <a:endParaRPr lang="ko-KR" altLang="en-US"/>
           </a:p>
@@ -2922,7 +2922,7 @@
           <a:p>
             <a:fld id="{0DE30E30-8A3F-4C87-9FDC-8C9A3551B329}" type="datetimeFigureOut">
               <a:rPr lang="ko-KR" altLang="en-US" smtClean="0"/>
-              <a:t>2022-05-08</a:t>
+              <a:t>2022-05-09</a:t>
             </a:fld>
             <a:endParaRPr lang="ko-KR" altLang="en-US"/>
           </a:p>
@@ -5946,8 +5946,8 @@
           <a:lstStyle/>
           <a:p>
             <a:r>
-              <a:rPr lang="en-US" altLang="ko-KR" sz="4000" dirty="0" err="1"/>
-              <a:t>Envionment</a:t>
+              <a:rPr lang="en-US" altLang="ko-KR" sz="4000" dirty="0"/>
+              <a:t>Environment</a:t>
             </a:r>
             <a:endParaRPr lang="ko-KR" altLang="en-US" sz="4000" dirty="0"/>
           </a:p>

</xml_diff>